<commit_message>
Uploading newer version of presentation
</commit_message>
<xml_diff>
--- a/PPT/Managing VMware infrastructure using salt-cloud.pptx
+++ b/PPT/Managing VMware infrastructure using salt-cloud.pptx
@@ -26197,17 +26197,7 @@
                 <a:latin typeface="Calibri"/>
                 <a:cs typeface="Calibri"/>
               </a:rPr>
-              <a:t> #</a:t>
-            </a:r>
-            <a:r>
-              <a:rPr lang="en-US" b="1" dirty="0" smtClean="0">
-                <a:solidFill>
-                  <a:schemeClr val="lt1"/>
-                </a:solidFill>
-                <a:latin typeface="Calibri"/>
-                <a:cs typeface="Calibri"/>
-              </a:rPr>
-              <a:t>Clemson #</a:t>
+              <a:t> #Clemson #</a:t>
             </a:r>
             <a:r>
               <a:rPr lang="en-US" b="1" dirty="0" err="1" smtClean="0">
@@ -26548,7 +26538,7 @@
         </p:nvSpPr>
         <p:spPr>
           <a:xfrm>
-            <a:off x="450143" y="216535"/>
+            <a:off x="450143" y="384283"/>
             <a:ext cx="8229600" cy="585599"/>
           </a:xfrm>
           <a:prstGeom prst="rect">
@@ -26693,7 +26683,7 @@
         </p:nvSpPr>
         <p:spPr>
           <a:xfrm>
-            <a:off x="450143" y="805221"/>
+            <a:off x="450143" y="972969"/>
             <a:ext cx="5003699" cy="310800"/>
           </a:xfrm>
           <a:prstGeom prst="rect">
@@ -27033,17 +27023,7 @@
                 <a:latin typeface="Calibri"/>
                 <a:cs typeface="Calibri"/>
               </a:rPr>
-              <a:t>Spoken </a:t>
-            </a:r>
-            <a:r>
-              <a:rPr lang="en-US" sz="2000" dirty="0" smtClean="0">
-                <a:solidFill>
-                  <a:schemeClr val="dk1"/>
-                </a:solidFill>
-                <a:latin typeface="Calibri"/>
-                <a:cs typeface="Calibri"/>
-              </a:rPr>
-              <a:t>at various conferences including SaltConf15, </a:t>
+              <a:t>Spoken at various conferences including SaltConf15, </a:t>
             </a:r>
             <a:r>
               <a:rPr lang="en-US" sz="2000" dirty="0" err="1" smtClean="0">
@@ -27063,17 +27043,7 @@
                 <a:latin typeface="Calibri"/>
                 <a:cs typeface="Calibri"/>
               </a:rPr>
-              <a:t> Summit 2015 (Tokyo), </a:t>
-            </a:r>
-            <a:r>
-              <a:rPr lang="en-US" sz="2000" dirty="0" smtClean="0">
-                <a:solidFill>
-                  <a:schemeClr val="dk1"/>
-                </a:solidFill>
-                <a:latin typeface="Calibri"/>
-                <a:cs typeface="Calibri"/>
-              </a:rPr>
-              <a:t>SaltConf16, </a:t>
+              <a:t> Summit 2015 (Tokyo), SaltConf16, </a:t>
             </a:r>
             <a:r>
               <a:rPr lang="en-US" sz="2000" dirty="0" err="1" smtClean="0">
@@ -27093,27 +27063,7 @@
                 <a:latin typeface="Calibri"/>
                 <a:cs typeface="Calibri"/>
               </a:rPr>
-              <a:t> conference 2016 (Germany) </a:t>
-            </a:r>
-            <a:r>
-              <a:rPr lang="en-US" sz="2000" dirty="0" smtClean="0">
-                <a:solidFill>
-                  <a:schemeClr val="dk1"/>
-                </a:solidFill>
-                <a:latin typeface="Calibri"/>
-                <a:cs typeface="Calibri"/>
-              </a:rPr>
-              <a:t>etc</a:t>
-            </a:r>
-            <a:r>
-              <a:rPr lang="en-US" sz="2000" dirty="0" smtClean="0">
-                <a:solidFill>
-                  <a:schemeClr val="dk1"/>
-                </a:solidFill>
-                <a:latin typeface="Calibri"/>
-                <a:cs typeface="Calibri"/>
-              </a:rPr>
-              <a:t>.</a:t>
+              <a:t> conference 2016 (Germany) etc.</a:t>
             </a:r>
           </a:p>
           <a:p>
@@ -27259,17 +27209,7 @@
                 <a:latin typeface="Calibri"/>
                 <a:cs typeface="Calibri"/>
               </a:rPr>
-              <a:t>Few </a:t>
-            </a:r>
-            <a:r>
-              <a:rPr lang="en-US" sz="2000" dirty="0" smtClean="0">
-                <a:solidFill>
-                  <a:schemeClr val="dk1"/>
-                </a:solidFill>
-                <a:latin typeface="Calibri"/>
-                <a:cs typeface="Calibri"/>
-              </a:rPr>
-              <a:t>of the significant contributions made include making Salt compatible with Python 3, creating salt-cloud VMware driver, creating DNS/ASAM/Spacewalk runners, creating ZFS/</a:t>
+              <a:t>Few of the significant contributions made include making Salt compatible with Python 3, creating salt-cloud VMware driver, creating DNS/ASAM/Spacewalk runners, creating ZFS/</a:t>
             </a:r>
             <a:r>
               <a:rPr lang="en-US" sz="2000" dirty="0" err="1" smtClean="0">
@@ -27356,7 +27296,7 @@
         </p:nvSpPr>
         <p:spPr>
           <a:xfrm>
-            <a:off x="450143" y="216535"/>
+            <a:off x="450143" y="384283"/>
             <a:ext cx="8229600" cy="585599"/>
           </a:xfrm>
           <a:prstGeom prst="rect">
@@ -27501,7 +27441,7 @@
         </p:nvSpPr>
         <p:spPr>
           <a:xfrm>
-            <a:off x="450143" y="805221"/>
+            <a:off x="450143" y="972969"/>
             <a:ext cx="5003699" cy="310800"/>
           </a:xfrm>
           <a:prstGeom prst="rect">
@@ -27986,7 +27926,7 @@
         </p:nvSpPr>
         <p:spPr>
           <a:xfrm>
-            <a:off x="450143" y="216535"/>
+            <a:off x="450143" y="384283"/>
             <a:ext cx="8229600" cy="585599"/>
           </a:xfrm>
           <a:prstGeom prst="rect">
@@ -28131,7 +28071,7 @@
         </p:nvSpPr>
         <p:spPr>
           <a:xfrm>
-            <a:off x="450143" y="805221"/>
+            <a:off x="450143" y="972969"/>
             <a:ext cx="5003699" cy="310800"/>
           </a:xfrm>
           <a:prstGeom prst="rect">
@@ -28626,7 +28566,7 @@
         </p:nvSpPr>
         <p:spPr>
           <a:xfrm>
-            <a:off x="450143" y="216535"/>
+            <a:off x="450143" y="384283"/>
             <a:ext cx="8229600" cy="585599"/>
           </a:xfrm>
           <a:prstGeom prst="rect">
@@ -28781,7 +28721,7 @@
         </p:nvSpPr>
         <p:spPr>
           <a:xfrm>
-            <a:off x="450143" y="805221"/>
+            <a:off x="450143" y="972969"/>
             <a:ext cx="5003699" cy="310800"/>
           </a:xfrm>
           <a:prstGeom prst="rect">
@@ -29027,17 +28967,7 @@
                 <a:latin typeface="Calibri"/>
                 <a:cs typeface="Calibri"/>
               </a:rPr>
-              <a:t>what is it? </a:t>
-            </a:r>
-            <a:r>
-              <a:rPr lang="en-US" sz="1800" i="1" dirty="0" smtClean="0">
-                <a:solidFill>
-                  <a:srgbClr val="42942A"/>
-                </a:solidFill>
-                <a:latin typeface="Calibri"/>
-                <a:cs typeface="Calibri"/>
-              </a:rPr>
-              <a:t>why was it created?</a:t>
+              <a:t>what is it? why was it created?</a:t>
             </a:r>
             <a:endParaRPr lang="en-US" sz="1800" i="1" dirty="0">
               <a:solidFill>
@@ -29350,13 +29280,6 @@
               </a:rPr>
               <a:t>, VMware and many more!</a:t>
             </a:r>
-            <a:endParaRPr lang="en-US" sz="2000" dirty="0">
-              <a:solidFill>
-                <a:schemeClr val="dk1"/>
-              </a:solidFill>
-              <a:latin typeface="Calibri"/>
-              <a:cs typeface="Calibri"/>
-            </a:endParaRPr>
           </a:p>
         </p:txBody>
       </p:sp>
@@ -29407,7 +29330,7 @@
         </p:nvSpPr>
         <p:spPr>
           <a:xfrm>
-            <a:off x="450143" y="216535"/>
+            <a:off x="450143" y="384283"/>
             <a:ext cx="8229600" cy="585599"/>
           </a:xfrm>
           <a:prstGeom prst="rect">
@@ -29552,7 +29475,7 @@
         </p:nvSpPr>
         <p:spPr>
           <a:xfrm>
-            <a:off x="450143" y="805221"/>
+            <a:off x="450143" y="972969"/>
             <a:ext cx="5003699" cy="310800"/>
           </a:xfrm>
           <a:prstGeom prst="rect">
@@ -30471,17 +30394,7 @@
                 <a:latin typeface="Calibri"/>
                 <a:cs typeface="Calibri"/>
               </a:rPr>
-              <a:t> #</a:t>
-            </a:r>
-            <a:r>
-              <a:rPr lang="en-US" b="1" dirty="0" smtClean="0">
-                <a:solidFill>
-                  <a:schemeClr val="lt1"/>
-                </a:solidFill>
-                <a:latin typeface="Calibri"/>
-                <a:cs typeface="Calibri"/>
-              </a:rPr>
-              <a:t>Clemson #</a:t>
+              <a:t> #Clemson #</a:t>
             </a:r>
             <a:r>
               <a:rPr lang="en-US" b="1" dirty="0" err="1" smtClean="0">
@@ -32026,7 +31939,7 @@
   <a:extraClrSchemeLst/>
   <a:extLst>
     <a:ext uri="{05A4C25C-085E-4340-85A3-A5531E510DB2}">
-      <thm15:themeFamily xmlns:thm15="http://schemas.microsoft.com/office/thememl/2012/main" xmlns="" name="Office Theme" id="{62F939B6-93AF-4DB8-9C6B-D6C7DFDC589F}" vid="{4A3C46E8-61CC-4603-A589-7422A47A8E4A}"/>
+      <thm15:themeFamily xmlns="" xmlns:thm15="http://schemas.microsoft.com/office/thememl/2012/main" name="Office Theme" id="{62F939B6-93AF-4DB8-9C6B-D6C7DFDC589F}" vid="{4A3C46E8-61CC-4603-A589-7422A47A8E4A}"/>
     </a:ext>
   </a:extLst>
 </a:theme>
@@ -32321,7 +32234,7 @@
   <a:extraClrSchemeLst/>
   <a:extLst>
     <a:ext uri="{05A4C25C-085E-4340-85A3-A5531E510DB2}">
-      <thm15:themeFamily xmlns:thm15="http://schemas.microsoft.com/office/thememl/2012/main" xmlns="" name="Office Theme" id="{62F939B6-93AF-4DB8-9C6B-D6C7DFDC589F}" vid="{4A3C46E8-61CC-4603-A589-7422A47A8E4A}"/>
+      <thm15:themeFamily xmlns="" xmlns:thm15="http://schemas.microsoft.com/office/thememl/2012/main" name="Office Theme" id="{62F939B6-93AF-4DB8-9C6B-D6C7DFDC589F}" vid="{4A3C46E8-61CC-4603-A589-7422A47A8E4A}"/>
     </a:ext>
   </a:extLst>
 </a:theme>
@@ -32616,7 +32529,7 @@
   <a:extraClrSchemeLst/>
   <a:extLst>
     <a:ext uri="{05A4C25C-085E-4340-85A3-A5531E510DB2}">
-      <thm15:themeFamily xmlns:thm15="http://schemas.microsoft.com/office/thememl/2012/main" xmlns="" name="Office Theme" id="{62F939B6-93AF-4DB8-9C6B-D6C7DFDC589F}" vid="{4A3C46E8-61CC-4603-A589-7422A47A8E4A}"/>
+      <thm15:themeFamily xmlns="" xmlns:thm15="http://schemas.microsoft.com/office/thememl/2012/main" name="Office Theme" id="{62F939B6-93AF-4DB8-9C6B-D6C7DFDC589F}" vid="{4A3C46E8-61CC-4603-A589-7422A47A8E4A}"/>
     </a:ext>
   </a:extLst>
 </a:theme>
@@ -32911,7 +32824,7 @@
   <a:extraClrSchemeLst/>
   <a:extLst>
     <a:ext uri="{05A4C25C-085E-4340-85A3-A5531E510DB2}">
-      <thm15:themeFamily xmlns:thm15="http://schemas.microsoft.com/office/thememl/2012/main" xmlns="" name="Office Theme" id="{62F939B6-93AF-4DB8-9C6B-D6C7DFDC589F}" vid="{4A3C46E8-61CC-4603-A589-7422A47A8E4A}"/>
+      <thm15:themeFamily xmlns="" xmlns:thm15="http://schemas.microsoft.com/office/thememl/2012/main" name="Office Theme" id="{62F939B6-93AF-4DB8-9C6B-D6C7DFDC589F}" vid="{4A3C46E8-61CC-4603-A589-7422A47A8E4A}"/>
     </a:ext>
   </a:extLst>
 </a:theme>
@@ -33206,7 +33119,7 @@
   <a:extraClrSchemeLst/>
   <a:extLst>
     <a:ext uri="{05A4C25C-085E-4340-85A3-A5531E510DB2}">
-      <thm15:themeFamily xmlns:thm15="http://schemas.microsoft.com/office/thememl/2012/main" xmlns="" name="Office Theme" id="{62F939B6-93AF-4DB8-9C6B-D6C7DFDC589F}" vid="{4A3C46E8-61CC-4603-A589-7422A47A8E4A}"/>
+      <thm15:themeFamily xmlns="" xmlns:thm15="http://schemas.microsoft.com/office/thememl/2012/main" name="Office Theme" id="{62F939B6-93AF-4DB8-9C6B-D6C7DFDC589F}" vid="{4A3C46E8-61CC-4603-A589-7422A47A8E4A}"/>
     </a:ext>
   </a:extLst>
 </a:theme>
@@ -33501,7 +33414,7 @@
   <a:extraClrSchemeLst/>
   <a:extLst>
     <a:ext uri="{05A4C25C-085E-4340-85A3-A5531E510DB2}">
-      <thm15:themeFamily xmlns:thm15="http://schemas.microsoft.com/office/thememl/2012/main" xmlns="" name="Office Theme" id="{62F939B6-93AF-4DB8-9C6B-D6C7DFDC589F}" vid="{4A3C46E8-61CC-4603-A589-7422A47A8E4A}"/>
+      <thm15:themeFamily xmlns="" xmlns:thm15="http://schemas.microsoft.com/office/thememl/2012/main" name="Office Theme" id="{62F939B6-93AF-4DB8-9C6B-D6C7DFDC589F}" vid="{4A3C46E8-61CC-4603-A589-7422A47A8E4A}"/>
     </a:ext>
   </a:extLst>
 </a:theme>
@@ -33796,7 +33709,7 @@
   <a:extraClrSchemeLst/>
   <a:extLst>
     <a:ext uri="{05A4C25C-085E-4340-85A3-A5531E510DB2}">
-      <thm15:themeFamily xmlns:thm15="http://schemas.microsoft.com/office/thememl/2012/main" xmlns="" name="Office Theme" id="{62F939B6-93AF-4DB8-9C6B-D6C7DFDC589F}" vid="{4A3C46E8-61CC-4603-A589-7422A47A8E4A}"/>
+      <thm15:themeFamily xmlns="" xmlns:thm15="http://schemas.microsoft.com/office/thememl/2012/main" name="Office Theme" id="{62F939B6-93AF-4DB8-9C6B-D6C7DFDC589F}" vid="{4A3C46E8-61CC-4603-A589-7422A47A8E4A}"/>
     </a:ext>
   </a:extLst>
 </a:theme>
@@ -34091,7 +34004,7 @@
   <a:extraClrSchemeLst/>
   <a:extLst>
     <a:ext uri="{05A4C25C-085E-4340-85A3-A5531E510DB2}">
-      <thm15:themeFamily xmlns:thm15="http://schemas.microsoft.com/office/thememl/2012/main" xmlns="" name="Office Theme" id="{62F939B6-93AF-4DB8-9C6B-D6C7DFDC589F}" vid="{4A3C46E8-61CC-4603-A589-7422A47A8E4A}"/>
+      <thm15:themeFamily xmlns="" xmlns:thm15="http://schemas.microsoft.com/office/thememl/2012/main" name="Office Theme" id="{62F939B6-93AF-4DB8-9C6B-D6C7DFDC589F}" vid="{4A3C46E8-61CC-4603-A589-7422A47A8E4A}"/>
     </a:ext>
   </a:extLst>
 </a:theme>

</xml_diff>